<commit_message>
finish u-adv, dimensions matched
</commit_message>
<xml_diff>
--- a/理想风驱动.pptx
+++ b/理想风驱动.pptx
@@ -4,6 +4,9 @@
   <p:sldMasterIdLst>
     <p:sldMasterId id="2147483648" r:id="rId1"/>
   </p:sldMasterIdLst>
+  <p:notesMasterIdLst>
+    <p:notesMasterId r:id="rId11"/>
+  </p:notesMasterIdLst>
   <p:sldIdLst>
     <p:sldId id="256" r:id="rId2"/>
     <p:sldId id="257" r:id="rId3"/>
@@ -11,6 +14,9 @@
     <p:sldId id="259" r:id="rId5"/>
     <p:sldId id="260" r:id="rId6"/>
     <p:sldId id="261" r:id="rId7"/>
+    <p:sldId id="262" r:id="rId8"/>
+    <p:sldId id="264" r:id="rId9"/>
+    <p:sldId id="265" r:id="rId10"/>
   </p:sldIdLst>
   <p:sldSz cx="12192000" cy="6858000"/>
   <p:notesSz cx="6858000" cy="9144000"/>
@@ -126,6 +132,468 @@
     </p:ext>
   </p:extLst>
 </p:presentation>
+</file>
+
+<file path=ppt/ink/ink1.xml><?xml version="1.0" encoding="utf-8"?>
+<inkml:ink xmlns:inkml="http://www.w3.org/2003/InkML">
+  <inkml:definitions>
+    <inkml:context xml:id="ctx0">
+      <inkml:inkSource xml:id="inkSrc0">
+        <inkml:traceFormat>
+          <inkml:channel name="X" type="integer" max="3440" units="cm"/>
+          <inkml:channel name="Y" type="integer" max="1440" units="cm"/>
+          <inkml:channel name="T" type="integer" max="2.14748E9" units="dev"/>
+        </inkml:traceFormat>
+        <inkml:channelProperties>
+          <inkml:channelProperty channel="X" name="resolution" value="43.10777" units="1/cm"/>
+          <inkml:channelProperty channel="Y" name="resolution" value="43.11377" units="1/cm"/>
+          <inkml:channelProperty channel="T" name="resolution" value="1" units="1/dev"/>
+        </inkml:channelProperties>
+      </inkml:inkSource>
+      <inkml:timestamp xml:id="ts0" timeString="2025-03-18T06:04:17.783"/>
+    </inkml:context>
+    <inkml:brush xml:id="br0">
+      <inkml:brushProperty name="width" value="0.05292" units="cm"/>
+      <inkml:brushProperty name="height" value="0.05292" units="cm"/>
+      <inkml:brushProperty name="color" value="#FF0000"/>
+    </inkml:brush>
+  </inkml:definitions>
+  <inkml:trace contextRef="#ctx0" brushRef="#br0">17859 11800 0,'-13'14'62,"0"12"-31,-14 14-15,14 13 0,-40 105 15,40-91 0</inkml:trace>
+  <inkml:trace contextRef="#ctx0" brushRef="#br0" timeOffset="689.33">17925 11893 0,'0'0'0,"0"26"78,40 94-47,-14-68-15,27 41 15,-53-80-15,14-13 46,12-53-46,27-92-1,0-14 17,-40 106-17,-13 40 1,0-27 0,0 27-1,0 0 1</inkml:trace>
+  <inkml:trace contextRef="#ctx0" brushRef="#br0" timeOffset="1635.77">18243 12158 0,'0'-14'16,"53"41"46,-40-14-15,13 27-15,-26-27-17,0 0 16,14-13-31,-14 13 32,0 1 15,26-1-16,-26 0 0,13-13 0,1 0 79</inkml:trace>
+  <inkml:trace contextRef="#ctx0" brushRef="#br0" timeOffset="2220.26">18455 12197 0,'-14'0'31,"-12"0"0,-1 14 1,1-1-1,13 0-15,-67 27 15,41-1 0,52-39 78</inkml:trace>
+  <inkml:trace contextRef="#ctx0" brushRef="#br0" timeOffset="3000.44">18613 12171 0,'53'-13'94,"13"-1"-79,-39 14 1,65-13 0,-39 0 15,-26 13 0,-40 0 94</inkml:trace>
+  <inkml:trace contextRef="#ctx0" brushRef="#br0" timeOffset="3578.17">18825 11999 0,'-13'13'46,"13"0"-30,-14 53 15,14 1-15,0-28-16,-13 54 31,13-53 0,13-40 79</inkml:trace>
+  <inkml:trace contextRef="#ctx0" brushRef="#br0" timeOffset="4147.39">19209 11946 0,'0'-13'15,"0"26"32,0 40-31,0 53 0,-14 39 15,14-52 0,0-67-15,0 40-1</inkml:trace>
+  <inkml:trace contextRef="#ctx0" brushRef="#br0" timeOffset="7761.83">16854 12224 0,'-13'0'78,"-14"26"-62,-26 40 15,27-13 0,12-40 0,1 1-15,0-14 62,13 13-47,-13 0 1,13 0-1,-13-13 94</inkml:trace>
+  <inkml:trace contextRef="#ctx0" brushRef="#br0" timeOffset="9339.19">16867 12197 0,'0'14'78,"0"12"-62,0 0-16,0 41 31,13 12 0,-13-66 1,13-39 124,1-27-140,12-13 15,-13 0-16,1 13 1,-14 39 0,13-12-1</inkml:trace>
+  <inkml:trace contextRef="#ctx0" brushRef="#br0" timeOffset="10147.02">17013 12396 0,'13'-14'31,"-26"28"-31,39-28 32,-13 14-1,0 14 0,54 39 0,-41-27-31,1 1 32,-14-14-17,-13 0 16,26-13 110,-13 0-125,-13-13-1</inkml:trace>
+  <inkml:trace contextRef="#ctx0" brushRef="#br0" timeOffset="10684.75">17211 12422 0,'-13'0'16,"0"0"0,-14 40-1,14-27 1,-40 40 0,-13 13 15,39-39 0,14-27-15,13 13 31</inkml:trace>
+  <inkml:trace contextRef="#ctx0" brushRef="#br0" timeOffset="12532.79">15690 12184 0,'-14'0'141,"1"13"-126,-13 40 17,-93 159-17,79-133 16,40-66 1</inkml:trace>
+  <inkml:trace contextRef="#ctx0" brushRef="#br0" timeOffset="13372.12">15676 12224 0,'14'0'109,"12"79"-77,1-39-17,25 52 1,-12-39-1,-40-66 110,0-40-109,0 40 0,13-66-1,-13 52 1,14 14 0,-1-40-1,-13 40 1,0-27-1</inkml:trace>
+  <inkml:trace contextRef="#ctx0" brushRef="#br0" timeOffset="14233.9">15981 12396 0,'0'0'0,"0"-14"63,39 14-32,-25 0 0,12 27 0,-13-1-15,27 54 15,-14-41 1,-12-25-17,-1-14 126</inkml:trace>
+  <inkml:trace contextRef="#ctx0" brushRef="#br0" timeOffset="14796.35">16166 12422 0,'-27'0'47,"1"27"-16,-14 12 0,-39 41 1,79-67-17,-13 0 16</inkml:trace>
+  <inkml:trace contextRef="#ctx0" brushRef="#br0" timeOffset="26857.17">14049 17568 0,'0'-13'15,"0"26"64,-13-13-64,13 14 1,-13 12-1,13-13 1,0 0 0,-13 14 15,13-14-15,-14 0 15,14 14 0,-13-27 0,13 13 63</inkml:trace>
+  <inkml:trace contextRef="#ctx0" brushRef="#br0" timeOffset="28045.94">14155 17648 0,'0'-14'31,"26"1"63,14-26-48,-13 25-14,-14 1-1,-13 26 110,-13 14-126,-1-1 16,1 14-15,0-27 15,13 0 16,-13 1-31,-1-1 15,1-13 16,0 13-31,26-26 77,14-14-61,-14 14-1</inkml:trace>
+  <inkml:trace contextRef="#ctx0" brushRef="#br0" timeOffset="29616.37">14367 17634 0,'39'-39'235,"-12"12"-220,13 1 1,-14 13 15,-13-1 0,0 14 63,-13 14-78,0 39-1,27-1 17,-27-25-17,0-1 17,0-12-17,0-1 1,0 0-1,-13 14 17,-14-14-1,14 13 0,0-26-15,0 0-1,-1 0 142,-12-53-142,26 40 1,-40-40 0,40 40 15,-13 0-16,0-14 1,13 14 15,0 0 1</inkml:trace>
+  <inkml:trace contextRef="#ctx0" brushRef="#br0" timeOffset="45375.26">20121 11972 0,'27'0'47,"26"0"-32,13-13 1,66 0-1,-39 13 17,-80 0-1,-53 26 31,27-12-46</inkml:trace>
+  <inkml:trace contextRef="#ctx0" brushRef="#br0" timeOffset="45738.42">20082 12184 0,'0'0'0,"79"0"16,-26 0 15,106 0 0,-146 0-31</inkml:trace>
+  <inkml:trace contextRef="#ctx0" brushRef="#br0" timeOffset="46468.74">20836 11933 0,'-13'26'47,"13"-13"-32,0 54 1,0-54 0,0 40 15,0-40-15,0 0-1,0 0 1,0 1-1,0 25 32,0-25-15,0 12-1,0-13 0</inkml:trace>
+  <inkml:trace contextRef="#ctx0" brushRef="#br0" timeOffset="47511.25">21100 12039 0,'-26'13'63,"13"13"-32,-1 14-15,14-27-1,0 27 17,0-27-32,14 27 31,52 13-15,26-14 15,1-25 0,-80-14-15,14-14 15,-14 1 0,-13-13-15,0-1 15,0-12 0,-13-1 1,-27-13-17,-13-26 16,27 65 1,12 14-1,-12-13-15,-14 13 15,-13 0 0,14 0 0,52 0 79,0 0-110</inkml:trace>
+  <inkml:trace contextRef="#ctx0" brushRef="#br0" timeOffset="48159.65">21801 11893 0,'-13'0'15,"-26"79"16,25 27-15,14-40 0,0 53 15,0-66 0,0-13 0,14-14-15</inkml:trace>
+  <inkml:trace contextRef="#ctx0" brushRef="#br0" timeOffset="51747.37">754 476 0,'-13'13'125,"-27"67"-94,40-67-15,-13 53-1,13-39-15,-27 26 31,27-40-15</inkml:trace>
+  <inkml:trace contextRef="#ctx0" brushRef="#br0" timeOffset="52659.59">780 542 0,'14'0'141,"25"93"-110,-39-80-15,13 14 15,1-27 188,12-27-204,1-26 17,-14 0-17,40-13 16,-27 0 1</inkml:trace>
+  <inkml:trace contextRef="#ctx0" brushRef="#br0" timeOffset="53457.93">979 622 0,'13'0'94,"13"39"-63,27 14 0,-53-39 1,14-14 140,-1 0-141</inkml:trace>
+  <inkml:trace contextRef="#ctx0" brushRef="#br0" timeOffset="54313.36">1190 648 0,'-13'0'110,"-13"13"-95,-27 27 1,26 0 15,14-40 1,13 26 280,0 133-296,0-27 15,13-105 0</inkml:trace>
+  <inkml:trace contextRef="#ctx0" brushRef="#br0" timeOffset="54814.57">1296 754 0,'40'-13'15,"92"-14"1,-52 1 0,12 13 15,-79 13 0</inkml:trace>
+  <inkml:trace contextRef="#ctx0" brushRef="#br0" timeOffset="55504.84">1534 569 0,'-13'0'78,"0"106"-47,13-27 1,0-39-17,0-1 1,0-12-1</inkml:trace>
+  <inkml:trace contextRef="#ctx0" brushRef="#br0" timeOffset="56312.23">1865 516 0,'0'13'93,"-26"93"-61,12-27-1,14 40 0,-13-92-15,13-1 15</inkml:trace>
+</inkml:ink>
+</file>
+
+<file path=ppt/notesMasters/notesMaster1.xml><?xml version="1.0" encoding="utf-8"?>
+<p:notesMaster xmlns:a="http://schemas.openxmlformats.org/drawingml/2006/main" xmlns:r="http://schemas.openxmlformats.org/officeDocument/2006/relationships" xmlns:p="http://schemas.openxmlformats.org/presentationml/2006/main">
+  <p:cSld>
+    <p:bg>
+      <p:bgRef idx="1001">
+        <a:schemeClr val="bg1"/>
+      </p:bgRef>
+    </p:bg>
+    <p:spTree>
+      <p:nvGrpSpPr>
+        <p:cNvPr id="1" name=""/>
+        <p:cNvGrpSpPr/>
+        <p:nvPr/>
+      </p:nvGrpSpPr>
+      <p:grpSpPr>
+        <a:xfrm>
+          <a:off x="0" y="0"/>
+          <a:ext cx="0" cy="0"/>
+          <a:chOff x="0" y="0"/>
+          <a:chExt cx="0" cy="0"/>
+        </a:xfrm>
+      </p:grpSpPr>
+      <p:sp>
+        <p:nvSpPr>
+          <p:cNvPr id="2" name="页眉占位符 1"/>
+          <p:cNvSpPr>
+            <a:spLocks noGrp="1"/>
+          </p:cNvSpPr>
+          <p:nvPr>
+            <p:ph type="hdr" sz="quarter"/>
+          </p:nvPr>
+        </p:nvSpPr>
+        <p:spPr>
+          <a:xfrm>
+            <a:off x="0" y="0"/>
+            <a:ext cx="2971800" cy="458788"/>
+          </a:xfrm>
+          <a:prstGeom prst="rect">
+            <a:avLst/>
+          </a:prstGeom>
+        </p:spPr>
+        <p:txBody>
+          <a:bodyPr vert="horz" lIns="91440" tIns="45720" rIns="91440" bIns="45720" rtlCol="0"/>
+          <a:lstStyle>
+            <a:lvl1pPr algn="l">
+              <a:defRPr sz="1200"/>
+            </a:lvl1pPr>
+          </a:lstStyle>
+          <a:p>
+            <a:endParaRPr lang="zh-CN" altLang="en-US"/>
+          </a:p>
+        </p:txBody>
+      </p:sp>
+      <p:sp>
+        <p:nvSpPr>
+          <p:cNvPr id="3" name="日期占位符 2"/>
+          <p:cNvSpPr>
+            <a:spLocks noGrp="1"/>
+          </p:cNvSpPr>
+          <p:nvPr>
+            <p:ph type="dt" idx="1"/>
+          </p:nvPr>
+        </p:nvSpPr>
+        <p:spPr>
+          <a:xfrm>
+            <a:off x="3884613" y="0"/>
+            <a:ext cx="2971800" cy="458788"/>
+          </a:xfrm>
+          <a:prstGeom prst="rect">
+            <a:avLst/>
+          </a:prstGeom>
+        </p:spPr>
+        <p:txBody>
+          <a:bodyPr vert="horz" lIns="91440" tIns="45720" rIns="91440" bIns="45720" rtlCol="0"/>
+          <a:lstStyle>
+            <a:lvl1pPr algn="r">
+              <a:defRPr sz="1200"/>
+            </a:lvl1pPr>
+          </a:lstStyle>
+          <a:p>
+            <a:fld id="{CC4E2C19-A07B-48A9-B372-AF099A62855F}" type="datetimeFigureOut">
+              <a:rPr lang="zh-CN" altLang="en-US" smtClean="0"/>
+              <a:t>2025/3/18</a:t>
+            </a:fld>
+            <a:endParaRPr lang="zh-CN" altLang="en-US"/>
+          </a:p>
+        </p:txBody>
+      </p:sp>
+      <p:sp>
+        <p:nvSpPr>
+          <p:cNvPr id="4" name="幻灯片图像占位符 3"/>
+          <p:cNvSpPr>
+            <a:spLocks noGrp="1" noRot="1" noChangeAspect="1"/>
+          </p:cNvSpPr>
+          <p:nvPr>
+            <p:ph type="sldImg" idx="2"/>
+          </p:nvPr>
+        </p:nvSpPr>
+        <p:spPr>
+          <a:xfrm>
+            <a:off x="685800" y="1143000"/>
+            <a:ext cx="5486400" cy="3086100"/>
+          </a:xfrm>
+          <a:prstGeom prst="rect">
+            <a:avLst/>
+          </a:prstGeom>
+          <a:noFill/>
+          <a:ln w="12700">
+            <a:solidFill>
+              <a:prstClr val="black"/>
+            </a:solidFill>
+          </a:ln>
+        </p:spPr>
+        <p:txBody>
+          <a:bodyPr vert="horz" lIns="91440" tIns="45720" rIns="91440" bIns="45720" rtlCol="0" anchor="ctr"/>
+          <a:lstStyle/>
+          <a:p>
+            <a:endParaRPr lang="zh-CN" altLang="en-US"/>
+          </a:p>
+        </p:txBody>
+      </p:sp>
+      <p:sp>
+        <p:nvSpPr>
+          <p:cNvPr id="5" name="备注占位符 4"/>
+          <p:cNvSpPr>
+            <a:spLocks noGrp="1"/>
+          </p:cNvSpPr>
+          <p:nvPr>
+            <p:ph type="body" sz="quarter" idx="3"/>
+          </p:nvPr>
+        </p:nvSpPr>
+        <p:spPr>
+          <a:xfrm>
+            <a:off x="685800" y="4400550"/>
+            <a:ext cx="5486400" cy="3600450"/>
+          </a:xfrm>
+          <a:prstGeom prst="rect">
+            <a:avLst/>
+          </a:prstGeom>
+        </p:spPr>
+        <p:txBody>
+          <a:bodyPr vert="horz" lIns="91440" tIns="45720" rIns="91440" bIns="45720" rtlCol="0"/>
+          <a:lstStyle/>
+          <a:p>
+            <a:pPr lvl="0"/>
+            <a:r>
+              <a:rPr lang="zh-CN" altLang="en-US"/>
+              <a:t>单击此处编辑母版文本样式</a:t>
+            </a:r>
+          </a:p>
+          <a:p>
+            <a:pPr lvl="1"/>
+            <a:r>
+              <a:rPr lang="zh-CN" altLang="en-US"/>
+              <a:t>二级</a:t>
+            </a:r>
+          </a:p>
+          <a:p>
+            <a:pPr lvl="2"/>
+            <a:r>
+              <a:rPr lang="zh-CN" altLang="en-US"/>
+              <a:t>三级</a:t>
+            </a:r>
+          </a:p>
+          <a:p>
+            <a:pPr lvl="3"/>
+            <a:r>
+              <a:rPr lang="zh-CN" altLang="en-US"/>
+              <a:t>四级</a:t>
+            </a:r>
+          </a:p>
+          <a:p>
+            <a:pPr lvl="4"/>
+            <a:r>
+              <a:rPr lang="zh-CN" altLang="en-US"/>
+              <a:t>五级</a:t>
+            </a:r>
+          </a:p>
+        </p:txBody>
+      </p:sp>
+      <p:sp>
+        <p:nvSpPr>
+          <p:cNvPr id="6" name="页脚占位符 5"/>
+          <p:cNvSpPr>
+            <a:spLocks noGrp="1"/>
+          </p:cNvSpPr>
+          <p:nvPr>
+            <p:ph type="ftr" sz="quarter" idx="4"/>
+          </p:nvPr>
+        </p:nvSpPr>
+        <p:spPr>
+          <a:xfrm>
+            <a:off x="0" y="8685213"/>
+            <a:ext cx="2971800" cy="458787"/>
+          </a:xfrm>
+          <a:prstGeom prst="rect">
+            <a:avLst/>
+          </a:prstGeom>
+        </p:spPr>
+        <p:txBody>
+          <a:bodyPr vert="horz" lIns="91440" tIns="45720" rIns="91440" bIns="45720" rtlCol="0" anchor="b"/>
+          <a:lstStyle>
+            <a:lvl1pPr algn="l">
+              <a:defRPr sz="1200"/>
+            </a:lvl1pPr>
+          </a:lstStyle>
+          <a:p>
+            <a:endParaRPr lang="zh-CN" altLang="en-US"/>
+          </a:p>
+        </p:txBody>
+      </p:sp>
+      <p:sp>
+        <p:nvSpPr>
+          <p:cNvPr id="7" name="灯片编号占位符 6"/>
+          <p:cNvSpPr>
+            <a:spLocks noGrp="1"/>
+          </p:cNvSpPr>
+          <p:nvPr>
+            <p:ph type="sldNum" sz="quarter" idx="5"/>
+          </p:nvPr>
+        </p:nvSpPr>
+        <p:spPr>
+          <a:xfrm>
+            <a:off x="3884613" y="8685213"/>
+            <a:ext cx="2971800" cy="458787"/>
+          </a:xfrm>
+          <a:prstGeom prst="rect">
+            <a:avLst/>
+          </a:prstGeom>
+        </p:spPr>
+        <p:txBody>
+          <a:bodyPr vert="horz" lIns="91440" tIns="45720" rIns="91440" bIns="45720" rtlCol="0" anchor="b"/>
+          <a:lstStyle>
+            <a:lvl1pPr algn="r">
+              <a:defRPr sz="1200"/>
+            </a:lvl1pPr>
+          </a:lstStyle>
+          <a:p>
+            <a:fld id="{4DC72F05-9CC2-41A1-AB0F-6A4DECF301E5}" type="slidenum">
+              <a:rPr lang="zh-CN" altLang="en-US" smtClean="0"/>
+              <a:t>‹#›</a:t>
+            </a:fld>
+            <a:endParaRPr lang="zh-CN" altLang="en-US"/>
+          </a:p>
+        </p:txBody>
+      </p:sp>
+    </p:spTree>
+    <p:extLst>
+      <p:ext uri="{BB962C8B-B14F-4D97-AF65-F5344CB8AC3E}">
+        <p14:creationId xmlns:p14="http://schemas.microsoft.com/office/powerpoint/2010/main" val="1293763603"/>
+      </p:ext>
+    </p:extLst>
+  </p:cSld>
+  <p:clrMap bg1="lt1" tx1="dk1" bg2="lt2" tx2="dk2" accent1="accent1" accent2="accent2" accent3="accent3" accent4="accent4" accent5="accent5" accent6="accent6" hlink="hlink" folHlink="folHlink"/>
+  <p:notesStyle>
+    <a:lvl1pPr marL="0" algn="l" defTabSz="914400" rtl="0" eaLnBrk="1" latinLnBrk="0" hangingPunct="1">
+      <a:defRPr sz="1200" kern="1200">
+        <a:solidFill>
+          <a:schemeClr val="tx1"/>
+        </a:solidFill>
+        <a:latin typeface="+mn-lt"/>
+        <a:ea typeface="+mn-ea"/>
+        <a:cs typeface="+mn-cs"/>
+      </a:defRPr>
+    </a:lvl1pPr>
+    <a:lvl2pPr marL="457200" algn="l" defTabSz="914400" rtl="0" eaLnBrk="1" latinLnBrk="0" hangingPunct="1">
+      <a:defRPr sz="1200" kern="1200">
+        <a:solidFill>
+          <a:schemeClr val="tx1"/>
+        </a:solidFill>
+        <a:latin typeface="+mn-lt"/>
+        <a:ea typeface="+mn-ea"/>
+        <a:cs typeface="+mn-cs"/>
+      </a:defRPr>
+    </a:lvl2pPr>
+    <a:lvl3pPr marL="914400" algn="l" defTabSz="914400" rtl="0" eaLnBrk="1" latinLnBrk="0" hangingPunct="1">
+      <a:defRPr sz="1200" kern="1200">
+        <a:solidFill>
+          <a:schemeClr val="tx1"/>
+        </a:solidFill>
+        <a:latin typeface="+mn-lt"/>
+        <a:ea typeface="+mn-ea"/>
+        <a:cs typeface="+mn-cs"/>
+      </a:defRPr>
+    </a:lvl3pPr>
+    <a:lvl4pPr marL="1371600" algn="l" defTabSz="914400" rtl="0" eaLnBrk="1" latinLnBrk="0" hangingPunct="1">
+      <a:defRPr sz="1200" kern="1200">
+        <a:solidFill>
+          <a:schemeClr val="tx1"/>
+        </a:solidFill>
+        <a:latin typeface="+mn-lt"/>
+        <a:ea typeface="+mn-ea"/>
+        <a:cs typeface="+mn-cs"/>
+      </a:defRPr>
+    </a:lvl4pPr>
+    <a:lvl5pPr marL="1828800" algn="l" defTabSz="914400" rtl="0" eaLnBrk="1" latinLnBrk="0" hangingPunct="1">
+      <a:defRPr sz="1200" kern="1200">
+        <a:solidFill>
+          <a:schemeClr val="tx1"/>
+        </a:solidFill>
+        <a:latin typeface="+mn-lt"/>
+        <a:ea typeface="+mn-ea"/>
+        <a:cs typeface="+mn-cs"/>
+      </a:defRPr>
+    </a:lvl5pPr>
+    <a:lvl6pPr marL="2286000" algn="l" defTabSz="914400" rtl="0" eaLnBrk="1" latinLnBrk="0" hangingPunct="1">
+      <a:defRPr sz="1200" kern="1200">
+        <a:solidFill>
+          <a:schemeClr val="tx1"/>
+        </a:solidFill>
+        <a:latin typeface="+mn-lt"/>
+        <a:ea typeface="+mn-ea"/>
+        <a:cs typeface="+mn-cs"/>
+      </a:defRPr>
+    </a:lvl6pPr>
+    <a:lvl7pPr marL="2743200" algn="l" defTabSz="914400" rtl="0" eaLnBrk="1" latinLnBrk="0" hangingPunct="1">
+      <a:defRPr sz="1200" kern="1200">
+        <a:solidFill>
+          <a:schemeClr val="tx1"/>
+        </a:solidFill>
+        <a:latin typeface="+mn-lt"/>
+        <a:ea typeface="+mn-ea"/>
+        <a:cs typeface="+mn-cs"/>
+      </a:defRPr>
+    </a:lvl7pPr>
+    <a:lvl8pPr marL="3200400" algn="l" defTabSz="914400" rtl="0" eaLnBrk="1" latinLnBrk="0" hangingPunct="1">
+      <a:defRPr sz="1200" kern="1200">
+        <a:solidFill>
+          <a:schemeClr val="tx1"/>
+        </a:solidFill>
+        <a:latin typeface="+mn-lt"/>
+        <a:ea typeface="+mn-ea"/>
+        <a:cs typeface="+mn-cs"/>
+      </a:defRPr>
+    </a:lvl8pPr>
+    <a:lvl9pPr marL="3657600" algn="l" defTabSz="914400" rtl="0" eaLnBrk="1" latinLnBrk="0" hangingPunct="1">
+      <a:defRPr sz="1200" kern="1200">
+        <a:solidFill>
+          <a:schemeClr val="tx1"/>
+        </a:solidFill>
+        <a:latin typeface="+mn-lt"/>
+        <a:ea typeface="+mn-ea"/>
+        <a:cs typeface="+mn-cs"/>
+      </a:defRPr>
+    </a:lvl9pPr>
+  </p:notesStyle>
+</p:notesMaster>
+</file>
+
+<file path=ppt/notesSlides/notesSlide1.xml><?xml version="1.0" encoding="utf-8"?>
+<p:notes xmlns:a="http://schemas.openxmlformats.org/drawingml/2006/main" xmlns:r="http://schemas.openxmlformats.org/officeDocument/2006/relationships" xmlns:p="http://schemas.openxmlformats.org/presentationml/2006/main">
+  <p:cSld>
+    <p:spTree>
+      <p:nvGrpSpPr>
+        <p:cNvPr id="1" name=""/>
+        <p:cNvGrpSpPr/>
+        <p:nvPr/>
+      </p:nvGrpSpPr>
+      <p:grpSpPr>
+        <a:xfrm>
+          <a:off x="0" y="0"/>
+          <a:ext cx="0" cy="0"/>
+          <a:chOff x="0" y="0"/>
+          <a:chExt cx="0" cy="0"/>
+        </a:xfrm>
+      </p:grpSpPr>
+      <p:sp>
+        <p:nvSpPr>
+          <p:cNvPr id="2" name="幻灯片图像占位符 1"/>
+          <p:cNvSpPr>
+            <a:spLocks noGrp="1" noRot="1" noChangeAspect="1"/>
+          </p:cNvSpPr>
+          <p:nvPr>
+            <p:ph type="sldImg" idx="2"/>
+          </p:nvPr>
+        </p:nvSpPr>
+        <p:spPr/>
+      </p:sp>
+      <p:sp>
+        <p:nvSpPr>
+          <p:cNvPr id="3" name="文本占位符 2"/>
+          <p:cNvSpPr>
+            <a:spLocks noGrp="1"/>
+          </p:cNvSpPr>
+          <p:nvPr>
+            <p:ph type="body" idx="3"/>
+          </p:nvPr>
+        </p:nvSpPr>
+        <p:spPr/>
+        <p:txBody>
+          <a:bodyPr/>
+          <a:lstStyle/>
+          <a:p>
+            <a:endParaRPr lang="en-US" altLang="zh-CN"/>
+          </a:p>
+        </p:txBody>
+      </p:sp>
+    </p:spTree>
+  </p:cSld>
+  <p:clrMapOvr>
+    <a:masterClrMapping/>
+  </p:clrMapOvr>
+</p:notes>
 </file>
 
 <file path=ppt/slideLayouts/slideLayout1.xml><?xml version="1.0" encoding="utf-8"?>
@@ -4748,6 +5216,432 @@
 </p:sld>
 </file>
 
+<file path=ppt/slides/slide7.xml><?xml version="1.0" encoding="utf-8"?>
+<p:sld xmlns:a="http://schemas.openxmlformats.org/drawingml/2006/main" xmlns:r="http://schemas.openxmlformats.org/officeDocument/2006/relationships" xmlns:p="http://schemas.openxmlformats.org/presentationml/2006/main">
+  <p:cSld>
+    <p:spTree>
+      <p:nvGrpSpPr>
+        <p:cNvPr id="1" name=""/>
+        <p:cNvGrpSpPr/>
+        <p:nvPr/>
+      </p:nvGrpSpPr>
+      <p:grpSpPr>
+        <a:xfrm>
+          <a:off x="0" y="0"/>
+          <a:ext cx="0" cy="0"/>
+          <a:chOff x="0" y="0"/>
+          <a:chExt cx="0" cy="0"/>
+        </a:xfrm>
+      </p:grpSpPr>
+      <p:sp>
+        <p:nvSpPr>
+          <p:cNvPr id="2" name="标题 1">
+            <a:extLst>
+              <a:ext uri="{FF2B5EF4-FFF2-40B4-BE49-F238E27FC236}">
+                <a16:creationId xmlns:a16="http://schemas.microsoft.com/office/drawing/2014/main" id="{4C6CD637-7686-BFE6-041E-79B46CF20E5B}"/>
+              </a:ext>
+            </a:extLst>
+          </p:cNvPr>
+          <p:cNvSpPr>
+            <a:spLocks noGrp="1"/>
+          </p:cNvSpPr>
+          <p:nvPr>
+            <p:ph type="title"/>
+          </p:nvPr>
+        </p:nvSpPr>
+        <p:spPr/>
+        <p:txBody>
+          <a:bodyPr/>
+          <a:lstStyle/>
+          <a:p>
+            <a:endParaRPr lang="zh-CN" altLang="en-US"/>
+          </a:p>
+        </p:txBody>
+      </p:sp>
+      <p:pic>
+        <p:nvPicPr>
+          <p:cNvPr id="5" name="内容占位符 4" descr="图片包含 表格&#10;&#10;AI 生成的内容可能不正确。">
+            <a:extLst>
+              <a:ext uri="{FF2B5EF4-FFF2-40B4-BE49-F238E27FC236}">
+                <a16:creationId xmlns:a16="http://schemas.microsoft.com/office/drawing/2014/main" id="{5BAF0432-8480-0349-1E11-E011CE3A1059}"/>
+              </a:ext>
+            </a:extLst>
+          </p:cNvPr>
+          <p:cNvPicPr>
+            <a:picLocks noGrp="1" noChangeAspect="1"/>
+          </p:cNvPicPr>
+          <p:nvPr>
+            <p:ph idx="1"/>
+          </p:nvPr>
+        </p:nvPicPr>
+        <p:blipFill>
+          <a:blip r:embed="rId2">
+            <a:extLst>
+              <a:ext uri="{28A0092B-C50C-407E-A947-70E740481C1C}">
+                <a14:useLocalDpi xmlns:a14="http://schemas.microsoft.com/office/drawing/2010/main" val="0"/>
+              </a:ext>
+            </a:extLst>
+          </a:blip>
+          <a:srcRect t="23189"/>
+          <a:stretch/>
+        </p:blipFill>
+        <p:spPr>
+          <a:xfrm>
+            <a:off x="-833685" y="365125"/>
+            <a:ext cx="11944300" cy="5868035"/>
+          </a:xfrm>
+        </p:spPr>
+      </p:pic>
+    </p:spTree>
+    <p:extLst>
+      <p:ext uri="{BB962C8B-B14F-4D97-AF65-F5344CB8AC3E}">
+        <p14:creationId xmlns:p14="http://schemas.microsoft.com/office/powerpoint/2010/main" val="1144724561"/>
+      </p:ext>
+    </p:extLst>
+  </p:cSld>
+  <p:clrMapOvr>
+    <a:masterClrMapping/>
+  </p:clrMapOvr>
+</p:sld>
+</file>
+
+<file path=ppt/slides/slide8.xml><?xml version="1.0" encoding="utf-8"?>
+<p:sld xmlns:a="http://schemas.openxmlformats.org/drawingml/2006/main" xmlns:r="http://schemas.openxmlformats.org/officeDocument/2006/relationships" xmlns:p="http://schemas.openxmlformats.org/presentationml/2006/main">
+  <p:cSld>
+    <p:spTree>
+      <p:nvGrpSpPr>
+        <p:cNvPr id="1" name=""/>
+        <p:cNvGrpSpPr/>
+        <p:nvPr/>
+      </p:nvGrpSpPr>
+      <p:grpSpPr>
+        <a:xfrm>
+          <a:off x="0" y="0"/>
+          <a:ext cx="0" cy="0"/>
+          <a:chOff x="0" y="0"/>
+          <a:chExt cx="0" cy="0"/>
+        </a:xfrm>
+      </p:grpSpPr>
+      <p:pic>
+        <p:nvPicPr>
+          <p:cNvPr id="4" name="图片 3"/>
+          <p:cNvPicPr>
+            <a:picLocks noChangeAspect="1"/>
+          </p:cNvPicPr>
+          <p:nvPr/>
+        </p:nvPicPr>
+        <p:blipFill>
+          <a:blip r:embed="rId3"/>
+          <a:srcRect b="12059"/>
+          <a:stretch>
+            <a:fillRect/>
+          </a:stretch>
+        </p:blipFill>
+        <p:spPr>
+          <a:xfrm>
+            <a:off x="-66675" y="0"/>
+            <a:ext cx="6735445" cy="5144770"/>
+          </a:xfrm>
+          <a:prstGeom prst="rect">
+            <a:avLst/>
+          </a:prstGeom>
+        </p:spPr>
+      </p:pic>
+      <p:pic>
+        <p:nvPicPr>
+          <p:cNvPr id="2" name="图片 1"/>
+          <p:cNvPicPr>
+            <a:picLocks noChangeAspect="1"/>
+          </p:cNvPicPr>
+          <p:nvPr/>
+        </p:nvPicPr>
+        <p:blipFill>
+          <a:blip r:embed="rId4"/>
+          <a:stretch>
+            <a:fillRect/>
+          </a:stretch>
+        </p:blipFill>
+        <p:spPr>
+          <a:xfrm>
+            <a:off x="0" y="5429250"/>
+            <a:ext cx="7029450" cy="1428750"/>
+          </a:xfrm>
+          <a:prstGeom prst="rect">
+            <a:avLst/>
+          </a:prstGeom>
+        </p:spPr>
+      </p:pic>
+      <p:pic>
+        <p:nvPicPr>
+          <p:cNvPr id="3" name="图片 2"/>
+          <p:cNvPicPr>
+            <a:picLocks noChangeAspect="1"/>
+          </p:cNvPicPr>
+          <p:nvPr/>
+        </p:nvPicPr>
+        <p:blipFill>
+          <a:blip r:embed="rId3"/>
+          <a:srcRect l="66070" t="87572"/>
+          <a:stretch>
+            <a:fillRect/>
+          </a:stretch>
+        </p:blipFill>
+        <p:spPr>
+          <a:xfrm>
+            <a:off x="4383405" y="4540250"/>
+            <a:ext cx="2285365" cy="727075"/>
+          </a:xfrm>
+          <a:prstGeom prst="rect">
+            <a:avLst/>
+          </a:prstGeom>
+        </p:spPr>
+      </p:pic>
+      <p:sp>
+        <p:nvSpPr>
+          <p:cNvPr id="5" name="矩形 4">
+            <a:extLst>
+              <a:ext uri="{FF2B5EF4-FFF2-40B4-BE49-F238E27FC236}">
+                <a16:creationId xmlns:a16="http://schemas.microsoft.com/office/drawing/2014/main" id="{610B3C08-2413-6601-136A-55D0DEC5C71A}"/>
+              </a:ext>
+            </a:extLst>
+          </p:cNvPr>
+          <p:cNvSpPr/>
+          <p:nvPr/>
+        </p:nvSpPr>
+        <p:spPr>
+          <a:xfrm>
+            <a:off x="1668780" y="693420"/>
+            <a:ext cx="4236720" cy="2732405"/>
+          </a:xfrm>
+          <a:prstGeom prst="rect">
+            <a:avLst/>
+          </a:prstGeom>
+          <a:noFill/>
+          <a:ln>
+            <a:solidFill>
+              <a:srgbClr val="FF0000"/>
+            </a:solidFill>
+          </a:ln>
+        </p:spPr>
+        <p:style>
+          <a:lnRef idx="2">
+            <a:schemeClr val="accent1">
+              <a:shade val="15000"/>
+            </a:schemeClr>
+          </a:lnRef>
+          <a:fillRef idx="1">
+            <a:schemeClr val="accent1"/>
+          </a:fillRef>
+          <a:effectRef idx="0">
+            <a:schemeClr val="accent1"/>
+          </a:effectRef>
+          <a:fontRef idx="minor">
+            <a:schemeClr val="lt1"/>
+          </a:fontRef>
+        </p:style>
+        <p:txBody>
+          <a:bodyPr rtlCol="0" anchor="ctr"/>
+          <a:lstStyle/>
+          <a:p>
+            <a:pPr algn="ctr"/>
+            <a:endParaRPr lang="zh-CN" altLang="en-US"/>
+          </a:p>
+        </p:txBody>
+      </p:sp>
+      <mc:AlternateContent xmlns:mc="http://schemas.openxmlformats.org/markup-compatibility/2006">
+        <mc:Choice xmlns:p14="http://schemas.microsoft.com/office/powerpoint/2010/main" Requires="p14">
+          <p:contentPart p14:bwMode="auto" r:id="rId5">
+            <p14:nvContentPartPr>
+              <p14:cNvPr id="6" name="墨迹 5">
+                <a:extLst>
+                  <a:ext uri="{FF2B5EF4-FFF2-40B4-BE49-F238E27FC236}">
+                    <a16:creationId xmlns:a16="http://schemas.microsoft.com/office/drawing/2014/main" id="{C234D343-D66C-E9D8-2897-0B62A253216C}"/>
+                  </a:ext>
+                </a:extLst>
+              </p14:cNvPr>
+              <p14:cNvContentPartPr/>
+              <p14:nvPr/>
+            </p14:nvContentPartPr>
+            <p14:xfrm>
+              <a:off x="237960" y="147600"/>
+              <a:ext cx="7610760" cy="6258240"/>
+            </p14:xfrm>
+          </p:contentPart>
+        </mc:Choice>
+        <mc:Fallback>
+          <p:pic>
+            <p:nvPicPr>
+              <p:cNvPr id="6" name="墨迹 5">
+                <a:extLst>
+                  <a:ext uri="{FF2B5EF4-FFF2-40B4-BE49-F238E27FC236}">
+                    <a16:creationId xmlns:a16="http://schemas.microsoft.com/office/drawing/2014/main" id="{C234D343-D66C-E9D8-2897-0B62A253216C}"/>
+                  </a:ext>
+                </a:extLst>
+              </p:cNvPr>
+              <p:cNvPicPr/>
+              <p:nvPr/>
+            </p:nvPicPr>
+            <p:blipFill>
+              <a:blip r:embed="rId6"/>
+              <a:stretch>
+                <a:fillRect/>
+              </a:stretch>
+            </p:blipFill>
+            <p:spPr>
+              <a:xfrm>
+                <a:off x="228600" y="138240"/>
+                <a:ext cx="7629480" cy="6276960"/>
+              </a:xfrm>
+              <a:prstGeom prst="rect">
+                <a:avLst/>
+              </a:prstGeom>
+            </p:spPr>
+          </p:pic>
+        </mc:Fallback>
+      </mc:AlternateContent>
+    </p:spTree>
+    <p:custDataLst>
+      <p:tags r:id="rId1"/>
+    </p:custDataLst>
+  </p:cSld>
+  <p:clrMapOvr>
+    <a:masterClrMapping/>
+  </p:clrMapOvr>
+</p:sld>
+</file>
+
+<file path=ppt/slides/slide9.xml><?xml version="1.0" encoding="utf-8"?>
+<p:sld xmlns:a="http://schemas.openxmlformats.org/drawingml/2006/main" xmlns:r="http://schemas.openxmlformats.org/officeDocument/2006/relationships" xmlns:p="http://schemas.openxmlformats.org/presentationml/2006/main">
+  <p:cSld>
+    <p:spTree>
+      <p:nvGrpSpPr>
+        <p:cNvPr id="1" name=""/>
+        <p:cNvGrpSpPr/>
+        <p:nvPr/>
+      </p:nvGrpSpPr>
+      <p:grpSpPr>
+        <a:xfrm>
+          <a:off x="0" y="0"/>
+          <a:ext cx="0" cy="0"/>
+          <a:chOff x="0" y="0"/>
+          <a:chExt cx="0" cy="0"/>
+        </a:xfrm>
+      </p:grpSpPr>
+      <p:pic>
+        <p:nvPicPr>
+          <p:cNvPr id="30" name="图片 29" descr="日历&#10;&#10;AI 生成的内容可能不正确。">
+            <a:extLst>
+              <a:ext uri="{FF2B5EF4-FFF2-40B4-BE49-F238E27FC236}">
+                <a16:creationId xmlns:a16="http://schemas.microsoft.com/office/drawing/2014/main" id="{48A5E5A2-EB0A-1BFA-E641-830A6AE9C710}"/>
+              </a:ext>
+            </a:extLst>
+          </p:cNvPr>
+          <p:cNvPicPr>
+            <a:picLocks noChangeAspect="1"/>
+          </p:cNvPicPr>
+          <p:nvPr/>
+        </p:nvPicPr>
+        <p:blipFill>
+          <a:blip r:embed="rId4">
+            <a:extLst>
+              <a:ext uri="{28A0092B-C50C-407E-A947-70E740481C1C}">
+                <a14:useLocalDpi xmlns:a14="http://schemas.microsoft.com/office/drawing/2010/main" val="0"/>
+              </a:ext>
+            </a:extLst>
+          </a:blip>
+          <a:stretch>
+            <a:fillRect/>
+          </a:stretch>
+        </p:blipFill>
+        <p:spPr>
+          <a:xfrm>
+            <a:off x="1394756" y="299601"/>
+            <a:ext cx="9402487" cy="6258798"/>
+          </a:xfrm>
+          <a:prstGeom prst="rect">
+            <a:avLst/>
+          </a:prstGeom>
+        </p:spPr>
+      </p:pic>
+      <p:sp>
+        <p:nvSpPr>
+          <p:cNvPr id="31" name="矩形 30">
+            <a:extLst>
+              <a:ext uri="{FF2B5EF4-FFF2-40B4-BE49-F238E27FC236}">
+                <a16:creationId xmlns:a16="http://schemas.microsoft.com/office/drawing/2014/main" id="{C6CCE9F9-C2B8-307E-7537-5BCF6F49E472}"/>
+              </a:ext>
+            </a:extLst>
+          </p:cNvPr>
+          <p:cNvSpPr/>
+          <p:nvPr/>
+        </p:nvSpPr>
+        <p:spPr>
+          <a:xfrm>
+            <a:off x="3421380" y="1059179"/>
+            <a:ext cx="3749040" cy="2430781"/>
+          </a:xfrm>
+          <a:prstGeom prst="rect">
+            <a:avLst/>
+          </a:prstGeom>
+          <a:noFill/>
+          <a:ln>
+            <a:solidFill>
+              <a:srgbClr val="FF0000"/>
+            </a:solidFill>
+          </a:ln>
+        </p:spPr>
+        <p:style>
+          <a:lnRef idx="2">
+            <a:schemeClr val="accent1">
+              <a:shade val="15000"/>
+            </a:schemeClr>
+          </a:lnRef>
+          <a:fillRef idx="1">
+            <a:schemeClr val="accent1"/>
+          </a:fillRef>
+          <a:effectRef idx="0">
+            <a:schemeClr val="accent1"/>
+          </a:effectRef>
+          <a:fontRef idx="minor">
+            <a:schemeClr val="lt1"/>
+          </a:fontRef>
+        </p:style>
+        <p:txBody>
+          <a:bodyPr rtlCol="0" anchor="ctr"/>
+          <a:lstStyle/>
+          <a:p>
+            <a:pPr algn="ctr"/>
+            <a:endParaRPr lang="zh-CN" altLang="en-US"/>
+          </a:p>
+        </p:txBody>
+      </p:sp>
+    </p:spTree>
+    <p:custDataLst>
+      <p:tags r:id="rId1"/>
+    </p:custDataLst>
+  </p:cSld>
+  <p:clrMapOvr>
+    <a:masterClrMapping/>
+  </p:clrMapOvr>
+</p:sld>
+</file>
+
+<file path=ppt/tags/tag1.xml><?xml version="1.0" encoding="utf-8"?>
+<p:tagLst xmlns:a="http://schemas.openxmlformats.org/drawingml/2006/main" xmlns:r="http://schemas.openxmlformats.org/officeDocument/2006/relationships" xmlns:p="http://schemas.openxmlformats.org/presentationml/2006/main">
+  <p:tag name="KSO_WM_BEAUTIFY_FLAG" val="#wm#"/>
+  <p:tag name="KSO_WM_TEMPLATE_CATEGORY" val="custom"/>
+  <p:tag name="KSO_WM_TEMPLATE_INDEX" val="20205081"/>
+</p:tagLst>
+</file>
+
+<file path=ppt/tags/tag2.xml><?xml version="1.0" encoding="utf-8"?>
+<p:tagLst xmlns:a="http://schemas.openxmlformats.org/drawingml/2006/main" xmlns:r="http://schemas.openxmlformats.org/officeDocument/2006/relationships" xmlns:p="http://schemas.openxmlformats.org/presentationml/2006/main">
+  <p:tag name="KSO_WM_BEAUTIFY_FLAG" val="#wm#"/>
+  <p:tag name="KSO_WM_TEMPLATE_CATEGORY" val="custom"/>
+  <p:tag name="KSO_WM_TEMPLATE_INDEX" val="20205081"/>
+</p:tagLst>
+</file>
+
 <file path=ppt/theme/theme1.xml><?xml version="1.0" encoding="utf-8"?>
 <a:theme xmlns:a="http://schemas.openxmlformats.org/drawingml/2006/main" name="Office 主题​​">
   <a:themeElements>
@@ -5061,4 +5955,319 @@
     </a:ext>
   </a:extLst>
 </a:theme>
+</file>
+
+<file path=ppt/theme/theme2.xml><?xml version="1.0" encoding="utf-8"?>
+<a:theme xmlns:a="http://schemas.openxmlformats.org/drawingml/2006/main" name="Office 主题​​">
+  <a:themeElements>
+    <a:clrScheme name="Office">
+      <a:dk1>
+        <a:sysClr val="windowText" lastClr="000000"/>
+      </a:dk1>
+      <a:lt1>
+        <a:sysClr val="window" lastClr="FFFFFF"/>
+      </a:lt1>
+      <a:dk2>
+        <a:srgbClr val="0E2841"/>
+      </a:dk2>
+      <a:lt2>
+        <a:srgbClr val="E8E8E8"/>
+      </a:lt2>
+      <a:accent1>
+        <a:srgbClr val="156082"/>
+      </a:accent1>
+      <a:accent2>
+        <a:srgbClr val="E97132"/>
+      </a:accent2>
+      <a:accent3>
+        <a:srgbClr val="196B24"/>
+      </a:accent3>
+      <a:accent4>
+        <a:srgbClr val="0F9ED5"/>
+      </a:accent4>
+      <a:accent5>
+        <a:srgbClr val="A02B93"/>
+      </a:accent5>
+      <a:accent6>
+        <a:srgbClr val="4EA72E"/>
+      </a:accent6>
+      <a:hlink>
+        <a:srgbClr val="467886"/>
+      </a:hlink>
+      <a:folHlink>
+        <a:srgbClr val="96607D"/>
+      </a:folHlink>
+    </a:clrScheme>
+    <a:fontScheme name="Office">
+      <a:majorFont>
+        <a:latin typeface="等线 Light" panose="02110004020202020204"/>
+        <a:ea typeface=""/>
+        <a:cs typeface=""/>
+        <a:font script="Jpan" typeface="游ゴシック Light"/>
+        <a:font script="Hang" typeface="맑은 고딕"/>
+        <a:font script="Hans" typeface="等线 Light"/>
+        <a:font script="Hant" typeface="新細明體"/>
+        <a:font script="Arab" typeface="Times New Roman"/>
+        <a:font script="Hebr" typeface="Times New Roman"/>
+        <a:font script="Thai" typeface="Angsana New"/>
+        <a:font script="Ethi" typeface="Nyala"/>
+        <a:font script="Beng" typeface="Vrinda"/>
+        <a:font script="Gujr" typeface="Shruti"/>
+        <a:font script="Khmr" typeface="MoolBoran"/>
+        <a:font script="Knda" typeface="Tunga"/>
+        <a:font script="Guru" typeface="Raavi"/>
+        <a:font script="Cans" typeface="Euphemia"/>
+        <a:font script="Cher" typeface="Plantagenet Cherokee"/>
+        <a:font script="Yiii" typeface="Microsoft Yi Baiti"/>
+        <a:font script="Tibt" typeface="Microsoft Himalaya"/>
+        <a:font script="Thaa" typeface="MV Boli"/>
+        <a:font script="Deva" typeface="Mangal"/>
+        <a:font script="Telu" typeface="Gautami"/>
+        <a:font script="Taml" typeface="Latha"/>
+        <a:font script="Syrc" typeface="Estrangelo Edessa"/>
+        <a:font script="Orya" typeface="Kalinga"/>
+        <a:font script="Mlym" typeface="Kartika"/>
+        <a:font script="Laoo" typeface="DokChampa"/>
+        <a:font script="Sinh" typeface="Iskoola Pota"/>
+        <a:font script="Mong" typeface="Mongolian Baiti"/>
+        <a:font script="Viet" typeface="Times New Roman"/>
+        <a:font script="Uigh" typeface="Microsoft Uighur"/>
+        <a:font script="Geor" typeface="Sylfaen"/>
+        <a:font script="Armn" typeface="Arial"/>
+        <a:font script="Bugi" typeface="Leelawadee UI"/>
+        <a:font script="Bopo" typeface="Microsoft JhengHei"/>
+        <a:font script="Java" typeface="Javanese Text"/>
+        <a:font script="Lisu" typeface="Segoe UI"/>
+        <a:font script="Mymr" typeface="Myanmar Text"/>
+        <a:font script="Nkoo" typeface="Ebrima"/>
+        <a:font script="Olck" typeface="Nirmala UI"/>
+        <a:font script="Osma" typeface="Ebrima"/>
+        <a:font script="Phag" typeface="Phagspa"/>
+        <a:font script="Syrn" typeface="Estrangelo Edessa"/>
+        <a:font script="Syrj" typeface="Estrangelo Edessa"/>
+        <a:font script="Syre" typeface="Estrangelo Edessa"/>
+        <a:font script="Sora" typeface="Nirmala UI"/>
+        <a:font script="Tale" typeface="Microsoft Tai Le"/>
+        <a:font script="Talu" typeface="Microsoft New Tai Lue"/>
+        <a:font script="Tfng" typeface="Ebrima"/>
+      </a:majorFont>
+      <a:minorFont>
+        <a:latin typeface="等线" panose="02110004020202020204"/>
+        <a:ea typeface=""/>
+        <a:cs typeface=""/>
+        <a:font script="Jpan" typeface="游ゴシック"/>
+        <a:font script="Hang" typeface="맑은 고딕"/>
+        <a:font script="Hans" typeface="等线"/>
+        <a:font script="Hant" typeface="新細明體"/>
+        <a:font script="Arab" typeface="Arial"/>
+        <a:font script="Hebr" typeface="Arial"/>
+        <a:font script="Thai" typeface="Cordia New"/>
+        <a:font script="Ethi" typeface="Nyala"/>
+        <a:font script="Beng" typeface="Vrinda"/>
+        <a:font script="Gujr" typeface="Shruti"/>
+        <a:font script="Khmr" typeface="DaunPenh"/>
+        <a:font script="Knda" typeface="Tunga"/>
+        <a:font script="Guru" typeface="Raavi"/>
+        <a:font script="Cans" typeface="Euphemia"/>
+        <a:font script="Cher" typeface="Plantagenet Cherokee"/>
+        <a:font script="Yiii" typeface="Microsoft Yi Baiti"/>
+        <a:font script="Tibt" typeface="Microsoft Himalaya"/>
+        <a:font script="Thaa" typeface="MV Boli"/>
+        <a:font script="Deva" typeface="Mangal"/>
+        <a:font script="Telu" typeface="Gautami"/>
+        <a:font script="Taml" typeface="Latha"/>
+        <a:font script="Syrc" typeface="Estrangelo Edessa"/>
+        <a:font script="Orya" typeface="Kalinga"/>
+        <a:font script="Mlym" typeface="Kartika"/>
+        <a:font script="Laoo" typeface="DokChampa"/>
+        <a:font script="Sinh" typeface="Iskoola Pota"/>
+        <a:font script="Mong" typeface="Mongolian Baiti"/>
+        <a:font script="Viet" typeface="Arial"/>
+        <a:font script="Uigh" typeface="Microsoft Uighur"/>
+        <a:font script="Geor" typeface="Sylfaen"/>
+        <a:font script="Armn" typeface="Arial"/>
+        <a:font script="Bugi" typeface="Leelawadee UI"/>
+        <a:font script="Bopo" typeface="Microsoft JhengHei"/>
+        <a:font script="Java" typeface="Javanese Text"/>
+        <a:font script="Lisu" typeface="Segoe UI"/>
+        <a:font script="Mymr" typeface="Myanmar Text"/>
+        <a:font script="Nkoo" typeface="Ebrima"/>
+        <a:font script="Olck" typeface="Nirmala UI"/>
+        <a:font script="Osma" typeface="Ebrima"/>
+        <a:font script="Phag" typeface="Phagspa"/>
+        <a:font script="Syrn" typeface="Estrangelo Edessa"/>
+        <a:font script="Syrj" typeface="Estrangelo Edessa"/>
+        <a:font script="Syre" typeface="Estrangelo Edessa"/>
+        <a:font script="Sora" typeface="Nirmala UI"/>
+        <a:font script="Tale" typeface="Microsoft Tai Le"/>
+        <a:font script="Talu" typeface="Microsoft New Tai Lue"/>
+        <a:font script="Tfng" typeface="Ebrima"/>
+      </a:minorFont>
+    </a:fontScheme>
+    <a:fmtScheme name="Office">
+      <a:fillStyleLst>
+        <a:solidFill>
+          <a:schemeClr val="phClr"/>
+        </a:solidFill>
+        <a:gradFill rotWithShape="1">
+          <a:gsLst>
+            <a:gs pos="0">
+              <a:schemeClr val="phClr">
+                <a:lumMod val="110000"/>
+                <a:satMod val="105000"/>
+                <a:tint val="67000"/>
+              </a:schemeClr>
+            </a:gs>
+            <a:gs pos="50000">
+              <a:schemeClr val="phClr">
+                <a:lumMod val="105000"/>
+                <a:satMod val="103000"/>
+                <a:tint val="73000"/>
+              </a:schemeClr>
+            </a:gs>
+            <a:gs pos="100000">
+              <a:schemeClr val="phClr">
+                <a:lumMod val="105000"/>
+                <a:satMod val="109000"/>
+                <a:tint val="81000"/>
+              </a:schemeClr>
+            </a:gs>
+          </a:gsLst>
+          <a:lin ang="5400000" scaled="0"/>
+        </a:gradFill>
+        <a:gradFill rotWithShape="1">
+          <a:gsLst>
+            <a:gs pos="0">
+              <a:schemeClr val="phClr">
+                <a:satMod val="103000"/>
+                <a:lumMod val="102000"/>
+                <a:tint val="94000"/>
+              </a:schemeClr>
+            </a:gs>
+            <a:gs pos="50000">
+              <a:schemeClr val="phClr">
+                <a:satMod val="110000"/>
+                <a:lumMod val="100000"/>
+                <a:shade val="100000"/>
+              </a:schemeClr>
+            </a:gs>
+            <a:gs pos="100000">
+              <a:schemeClr val="phClr">
+                <a:lumMod val="99000"/>
+                <a:satMod val="120000"/>
+                <a:shade val="78000"/>
+              </a:schemeClr>
+            </a:gs>
+          </a:gsLst>
+          <a:lin ang="5400000" scaled="0"/>
+        </a:gradFill>
+      </a:fillStyleLst>
+      <a:lnStyleLst>
+        <a:ln w="12700" cap="flat" cmpd="sng" algn="ctr">
+          <a:solidFill>
+            <a:schemeClr val="phClr"/>
+          </a:solidFill>
+          <a:prstDash val="solid"/>
+          <a:miter lim="800000"/>
+        </a:ln>
+        <a:ln w="19050" cap="flat" cmpd="sng" algn="ctr">
+          <a:solidFill>
+            <a:schemeClr val="phClr"/>
+          </a:solidFill>
+          <a:prstDash val="solid"/>
+          <a:miter lim="800000"/>
+        </a:ln>
+        <a:ln w="25400" cap="flat" cmpd="sng" algn="ctr">
+          <a:solidFill>
+            <a:schemeClr val="phClr"/>
+          </a:solidFill>
+          <a:prstDash val="solid"/>
+          <a:miter lim="800000"/>
+        </a:ln>
+      </a:lnStyleLst>
+      <a:effectStyleLst>
+        <a:effectStyle>
+          <a:effectLst/>
+        </a:effectStyle>
+        <a:effectStyle>
+          <a:effectLst/>
+        </a:effectStyle>
+        <a:effectStyle>
+          <a:effectLst>
+            <a:outerShdw blurRad="57150" dist="19050" dir="5400000" algn="ctr" rotWithShape="0">
+              <a:srgbClr val="000000">
+                <a:alpha val="63000"/>
+              </a:srgbClr>
+            </a:outerShdw>
+          </a:effectLst>
+        </a:effectStyle>
+      </a:effectStyleLst>
+      <a:bgFillStyleLst>
+        <a:solidFill>
+          <a:schemeClr val="phClr"/>
+        </a:solidFill>
+        <a:solidFill>
+          <a:schemeClr val="phClr">
+            <a:tint val="95000"/>
+            <a:satMod val="170000"/>
+          </a:schemeClr>
+        </a:solidFill>
+        <a:gradFill rotWithShape="1">
+          <a:gsLst>
+            <a:gs pos="0">
+              <a:schemeClr val="phClr">
+                <a:tint val="93000"/>
+                <a:satMod val="150000"/>
+                <a:shade val="98000"/>
+                <a:lumMod val="102000"/>
+              </a:schemeClr>
+            </a:gs>
+            <a:gs pos="50000">
+              <a:schemeClr val="phClr">
+                <a:tint val="98000"/>
+                <a:satMod val="130000"/>
+                <a:shade val="90000"/>
+                <a:lumMod val="103000"/>
+              </a:schemeClr>
+            </a:gs>
+            <a:gs pos="100000">
+              <a:schemeClr val="phClr">
+                <a:shade val="63000"/>
+                <a:satMod val="120000"/>
+              </a:schemeClr>
+            </a:gs>
+          </a:gsLst>
+          <a:lin ang="5400000" scaled="0"/>
+        </a:gradFill>
+      </a:bgFillStyleLst>
+    </a:fmtScheme>
+  </a:themeElements>
+  <a:objectDefaults>
+    <a:lnDef>
+      <a:spPr/>
+      <a:bodyPr/>
+      <a:lstStyle/>
+      <a:style>
+        <a:lnRef idx="2">
+          <a:schemeClr val="accent1"/>
+        </a:lnRef>
+        <a:fillRef idx="0">
+          <a:schemeClr val="accent1"/>
+        </a:fillRef>
+        <a:effectRef idx="1">
+          <a:schemeClr val="accent1"/>
+        </a:effectRef>
+        <a:fontRef idx="minor">
+          <a:schemeClr val="tx1"/>
+        </a:fontRef>
+      </a:style>
+    </a:lnDef>
+  </a:objectDefaults>
+  <a:extraClrSchemeLst/>
+  <a:extLst>
+    <a:ext uri="{05A4C25C-085E-4340-85A3-A5531E510DB2}">
+      <thm15:themeFamily xmlns:thm15="http://schemas.microsoft.com/office/thememl/2012/main" name="Office Theme" id="{2E142A2C-CD16-42D6-873A-C26D2A0506FA}" vid="{1BDDFF52-6CD6-40A5-AB3C-68EB2F1E4D0A}"/>
+    </a:ext>
+  </a:extLst>
+</a:theme>
 </file>
</xml_diff>